<commit_message>
updated contribution guidelines for clarity and to add methods for contributing two different types of data
</commit_message>
<xml_diff>
--- a/to_add_to_docs_UNTRACKED/GEP Repository and Data Organization.pptx
+++ b/to_add_to_docs_UNTRACKED/GEP Repository and Data Organization.pptx
@@ -224,7 +224,7 @@
           <a:p>
             <a:fld id="{6951DFDB-A004-40F8-ACBE-896860486119}" type="datetimeFigureOut">
               <a:rPr lang="en-US" smtClean="0"/>
-              <a:t>7/8/2025</a:t>
+              <a:t>7/15/2025</a:t>
             </a:fld>
             <a:endParaRPr lang="en-US"/>
           </a:p>
@@ -722,7 +722,7 @@
           <a:p>
             <a:fld id="{986C5BEE-D8D4-4C5E-9A44-52FE39C8142E}" type="datetimeFigureOut">
               <a:rPr lang="en-US" smtClean="0"/>
-              <a:t>7/8/2025</a:t>
+              <a:t>7/15/2025</a:t>
             </a:fld>
             <a:endParaRPr lang="en-US"/>
           </a:p>
@@ -920,7 +920,7 @@
           <a:p>
             <a:fld id="{986C5BEE-D8D4-4C5E-9A44-52FE39C8142E}" type="datetimeFigureOut">
               <a:rPr lang="en-US" smtClean="0"/>
-              <a:t>7/8/2025</a:t>
+              <a:t>7/15/2025</a:t>
             </a:fld>
             <a:endParaRPr lang="en-US"/>
           </a:p>
@@ -1128,7 +1128,7 @@
           <a:p>
             <a:fld id="{986C5BEE-D8D4-4C5E-9A44-52FE39C8142E}" type="datetimeFigureOut">
               <a:rPr lang="en-US" smtClean="0"/>
-              <a:t>7/8/2025</a:t>
+              <a:t>7/15/2025</a:t>
             </a:fld>
             <a:endParaRPr lang="en-US"/>
           </a:p>
@@ -1326,7 +1326,7 @@
           <a:p>
             <a:fld id="{986C5BEE-D8D4-4C5E-9A44-52FE39C8142E}" type="datetimeFigureOut">
               <a:rPr lang="en-US" smtClean="0"/>
-              <a:t>7/8/2025</a:t>
+              <a:t>7/15/2025</a:t>
             </a:fld>
             <a:endParaRPr lang="en-US"/>
           </a:p>
@@ -1601,7 +1601,7 @@
           <a:p>
             <a:fld id="{986C5BEE-D8D4-4C5E-9A44-52FE39C8142E}" type="datetimeFigureOut">
               <a:rPr lang="en-US" smtClean="0"/>
-              <a:t>7/8/2025</a:t>
+              <a:t>7/15/2025</a:t>
             </a:fld>
             <a:endParaRPr lang="en-US"/>
           </a:p>
@@ -1866,7 +1866,7 @@
           <a:p>
             <a:fld id="{986C5BEE-D8D4-4C5E-9A44-52FE39C8142E}" type="datetimeFigureOut">
               <a:rPr lang="en-US" smtClean="0"/>
-              <a:t>7/8/2025</a:t>
+              <a:t>7/15/2025</a:t>
             </a:fld>
             <a:endParaRPr lang="en-US"/>
           </a:p>
@@ -2278,7 +2278,7 @@
           <a:p>
             <a:fld id="{986C5BEE-D8D4-4C5E-9A44-52FE39C8142E}" type="datetimeFigureOut">
               <a:rPr lang="en-US" smtClean="0"/>
-              <a:t>7/8/2025</a:t>
+              <a:t>7/15/2025</a:t>
             </a:fld>
             <a:endParaRPr lang="en-US"/>
           </a:p>
@@ -2419,7 +2419,7 @@
           <a:p>
             <a:fld id="{986C5BEE-D8D4-4C5E-9A44-52FE39C8142E}" type="datetimeFigureOut">
               <a:rPr lang="en-US" smtClean="0"/>
-              <a:t>7/8/2025</a:t>
+              <a:t>7/15/2025</a:t>
             </a:fld>
             <a:endParaRPr lang="en-US"/>
           </a:p>
@@ -2532,7 +2532,7 @@
           <a:p>
             <a:fld id="{986C5BEE-D8D4-4C5E-9A44-52FE39C8142E}" type="datetimeFigureOut">
               <a:rPr lang="en-US" smtClean="0"/>
-              <a:t>7/8/2025</a:t>
+              <a:t>7/15/2025</a:t>
             </a:fld>
             <a:endParaRPr lang="en-US"/>
           </a:p>
@@ -2843,7 +2843,7 @@
           <a:p>
             <a:fld id="{986C5BEE-D8D4-4C5E-9A44-52FE39C8142E}" type="datetimeFigureOut">
               <a:rPr lang="en-US" smtClean="0"/>
-              <a:t>7/8/2025</a:t>
+              <a:t>7/15/2025</a:t>
             </a:fld>
             <a:endParaRPr lang="en-US"/>
           </a:p>
@@ -3131,7 +3131,7 @@
           <a:p>
             <a:fld id="{986C5BEE-D8D4-4C5E-9A44-52FE39C8142E}" type="datetimeFigureOut">
               <a:rPr lang="en-US" smtClean="0"/>
-              <a:t>7/8/2025</a:t>
+              <a:t>7/15/2025</a:t>
             </a:fld>
             <a:endParaRPr lang="en-US"/>
           </a:p>
@@ -3372,7 +3372,7 @@
           <a:p>
             <a:fld id="{986C5BEE-D8D4-4C5E-9A44-52FE39C8142E}" type="datetimeFigureOut">
               <a:rPr lang="en-US" smtClean="0"/>
-              <a:t>7/8/2025</a:t>
+              <a:t>7/15/2025</a:t>
             </a:fld>
             <a:endParaRPr lang="en-US"/>
           </a:p>

</xml_diff>